<commit_message>
GitHub issue 8_10, and other small fixes
</commit_message>
<xml_diff>
--- a/doc/CDISC_COSA_webinar_20231005_dataset-json_SAS.pptx
+++ b/doc/CDISC_COSA_webinar_20231005_dataset-json_SAS.pptx
@@ -5,7 +5,7 @@
     <p:sldMasterId id="2147483674" r:id="rId1"/>
   </p:sldMasterIdLst>
   <p:notesMasterIdLst>
-    <p:notesMasterId r:id="rId40"/>
+    <p:notesMasterId r:id="rId43"/>
   </p:notesMasterIdLst>
   <p:sldIdLst>
     <p:sldId id="256" r:id="rId2"/>
@@ -42,10 +42,13 @@
     <p:sldId id="1001" r:id="rId33"/>
     <p:sldId id="280" r:id="rId34"/>
     <p:sldId id="800" r:id="rId35"/>
-    <p:sldId id="999" r:id="rId36"/>
-    <p:sldId id="997" r:id="rId37"/>
-    <p:sldId id="833" r:id="rId38"/>
-    <p:sldId id="274" r:id="rId39"/>
+    <p:sldId id="1002" r:id="rId36"/>
+    <p:sldId id="1003" r:id="rId37"/>
+    <p:sldId id="1004" r:id="rId38"/>
+    <p:sldId id="999" r:id="rId39"/>
+    <p:sldId id="997" r:id="rId40"/>
+    <p:sldId id="833" r:id="rId41"/>
+    <p:sldId id="274" r:id="rId42"/>
   </p:sldIdLst>
   <p:sldSz cx="9144000" cy="5143500" type="screen16x9"/>
   <p:notesSz cx="6858000" cy="9144000"/>
@@ -1789,7 +1792,7 @@
           <a:p>
             <a:fld id="{84E17163-B04C-C34A-8000-FDF58C3633A6}" type="slidenum">
               <a:rPr lang="en-US" smtClean="0"/>
-              <a:t>37</a:t>
+              <a:t>40</a:t>
             </a:fld>
             <a:endParaRPr lang="en-US" dirty="0"/>
           </a:p>
@@ -16536,7 +16539,7 @@
         </p:nvSpPr>
         <p:spPr>
           <a:xfrm>
-            <a:off x="2019868" y="811013"/>
+            <a:off x="2068431" y="686322"/>
             <a:ext cx="6312089" cy="4020294"/>
           </a:xfrm>
         </p:spPr>
@@ -16588,7 +16591,7 @@
                 </a:solidFill>
                 <a:latin typeface="Consolas" panose="020B0609020204030204" pitchFamily="49" charset="0"/>
               </a:rPr>
-              <a:t>    dataset=                   </a:t>
+              <a:t>    dataset=                    </a:t>
             </a:r>
             <a:r>
               <a:rPr lang="en-US" sz="1200" b="0" i="0" dirty="0">
@@ -16617,7 +16620,7 @@
                 </a:solidFill>
                 <a:latin typeface="Consolas" panose="020B0609020204030204" pitchFamily="49" charset="0"/>
               </a:rPr>
-              <a:t>    xptpath=,                  </a:t>
+              <a:t>    xptpath=,                   </a:t>
             </a:r>
             <a:r>
               <a:rPr lang="en-US" sz="1200" b="0" i="0" dirty="0">
@@ -16646,7 +16649,7 @@
                 </a:solidFill>
                 <a:latin typeface="Consolas" panose="020B0609020204030204" pitchFamily="49" charset="0"/>
               </a:rPr>
-              <a:t>    jsonpath=,                 </a:t>
+              <a:t>    jsonpath=,                  </a:t>
             </a:r>
             <a:r>
               <a:rPr lang="en-US" sz="1200" b="0" i="0" dirty="0">
@@ -16678,7 +16681,7 @@
                 </a:solidFill>
                 <a:latin typeface="Consolas" panose="020B0609020204030204" pitchFamily="49" charset="0"/>
               </a:rPr>
-              <a:t>    usemetadata=N,             </a:t>
+              <a:t>    usemetadata=N,              </a:t>
             </a:r>
             <a:r>
               <a:rPr lang="en-US" sz="1200" b="0" i="0" dirty="0">
@@ -16707,7 +16710,7 @@
                 </a:solidFill>
                 <a:latin typeface="Consolas" panose="020B0609020204030204" pitchFamily="49" charset="0"/>
               </a:rPr>
-              <a:t>    metadatalib=,              </a:t>
+              <a:t>    metadatalib=,               </a:t>
             </a:r>
             <a:r>
               <a:rPr lang="pt-BR" sz="1200" b="0" i="0" dirty="0">
@@ -16718,25 +16721,65 @@
               </a:rPr>
               <a:t>/* Define-XML metadata library        */</a:t>
             </a:r>
-            <a:endParaRPr lang="pt-BR" sz="1200" b="0" i="0" dirty="0">
-              <a:solidFill>
-                <a:srgbClr val="000000"/>
-              </a:solidFill>
-              <a:latin typeface="Consolas" panose="020B0609020204030204" pitchFamily="49" charset="0"/>
-            </a:endParaRPr>
           </a:p>
           <a:p>
             <a:pPr marL="0" indent="0">
               <a:buNone/>
             </a:pPr>
             <a:r>
+              <a:rPr lang="pt-BR" sz="1200" dirty="0">
+                <a:solidFill>
+                  <a:srgbClr val="008000"/>
+                </a:solidFill>
+                <a:latin typeface="Consolas" panose="020B0609020204030204" pitchFamily="49" charset="0"/>
+              </a:rPr>
+              <a:t>    </a:t>
+            </a:r>
+            <a:r>
+              <a:rPr lang="pt-BR" sz="1200" dirty="0">
+                <a:solidFill>
+                  <a:srgbClr val="000000"/>
+                </a:solidFill>
+                <a:latin typeface="Consolas" panose="020B0609020204030204" pitchFamily="49" charset="0"/>
+              </a:rPr>
+              <a:t>datasetJSONVersion=1.0.0,</a:t>
+            </a:r>
+          </a:p>
+          <a:p>
+            <a:pPr marL="0" indent="0">
+              <a:buNone/>
+            </a:pPr>
+            <a:r>
               <a:rPr lang="en-US" sz="1200" b="0" i="0" dirty="0">
                 <a:solidFill>
                   <a:srgbClr val="000000"/>
                 </a:solidFill>
                 <a:latin typeface="Consolas" panose="020B0609020204030204" pitchFamily="49" charset="0"/>
               </a:rPr>
-              <a:t>    fileOID=,</a:t>
+              <a:t>    fileOID=, </a:t>
+            </a:r>
+          </a:p>
+          <a:p>
+            <a:pPr marL="0" indent="0">
+              <a:buNone/>
+            </a:pPr>
+            <a:r>
+              <a:rPr lang="en-US" sz="1200" dirty="0">
+                <a:solidFill>
+                  <a:srgbClr val="000000"/>
+                </a:solidFill>
+                <a:latin typeface="Consolas" panose="020B0609020204030204" pitchFamily="49" charset="0"/>
+              </a:rPr>
+              <a:t>    </a:t>
+            </a:r>
+            <a:r>
+              <a:rPr lang="en-US" sz="1200" b="0" i="0" dirty="0">
+                <a:solidFill>
+                  <a:srgbClr val="000000"/>
+                </a:solidFill>
+                <a:latin typeface="Consolas" panose="020B0609020204030204" pitchFamily="49" charset="0"/>
+              </a:rPr>
+              <a:t>asOfDateTime=,</a:t>
             </a:r>
           </a:p>
           <a:p>
@@ -16983,10 +17026,10 @@
       </p:sp>
       <p:pic>
         <p:nvPicPr>
-          <p:cNvPr id="5" name="Picture 4">
+          <p:cNvPr id="8" name="Picture 7">
             <a:extLst>
               <a:ext uri="{FF2B5EF4-FFF2-40B4-BE49-F238E27FC236}">
-                <a16:creationId xmlns:a16="http://schemas.microsoft.com/office/drawing/2014/main" id="{60C89201-5FA9-8B67-6BCC-685A4E6ACC65}"/>
+                <a16:creationId xmlns:a16="http://schemas.microsoft.com/office/drawing/2014/main" id="{A0D07DB4-0179-6A35-6BA6-F50565BB386C}"/>
               </a:ext>
             </a:extLst>
           </p:cNvPr>
@@ -17003,8 +17046,8 @@
         </p:blipFill>
         <p:spPr>
           <a:xfrm>
-            <a:off x="1875758" y="994172"/>
-            <a:ext cx="6504762" cy="3942857"/>
+            <a:off x="1002092" y="751423"/>
+            <a:ext cx="6894999" cy="3724306"/>
           </a:xfrm>
           <a:prstGeom prst="rect">
             <a:avLst/>
@@ -20506,10 +20549,10 @@
       </p:sp>
       <p:pic>
         <p:nvPicPr>
-          <p:cNvPr id="5" name="Picture 4">
+          <p:cNvPr id="6" name="Picture 5">
             <a:extLst>
               <a:ext uri="{FF2B5EF4-FFF2-40B4-BE49-F238E27FC236}">
-                <a16:creationId xmlns:a16="http://schemas.microsoft.com/office/drawing/2014/main" id="{2F055CDF-DDB8-91F8-E07C-DC8BF99EBE60}"/>
+                <a16:creationId xmlns:a16="http://schemas.microsoft.com/office/drawing/2014/main" id="{1E9AEDCB-6A1A-1DED-4D2D-D1ED1F6AD940}"/>
               </a:ext>
             </a:extLst>
           </p:cNvPr>
@@ -20526,8 +20569,38 @@
         </p:blipFill>
         <p:spPr>
           <a:xfrm>
-            <a:off x="1751949" y="751804"/>
-            <a:ext cx="6628571" cy="4152381"/>
+            <a:off x="1009759" y="791598"/>
+            <a:ext cx="3783025" cy="1960391"/>
+          </a:xfrm>
+          <a:prstGeom prst="rect">
+            <a:avLst/>
+          </a:prstGeom>
+        </p:spPr>
+      </p:pic>
+      <p:pic>
+        <p:nvPicPr>
+          <p:cNvPr id="7" name="Picture 6">
+            <a:extLst>
+              <a:ext uri="{FF2B5EF4-FFF2-40B4-BE49-F238E27FC236}">
+                <a16:creationId xmlns:a16="http://schemas.microsoft.com/office/drawing/2014/main" id="{CE1FD599-0857-1B60-D22C-25A05F4ECFFD}"/>
+              </a:ext>
+            </a:extLst>
+          </p:cNvPr>
+          <p:cNvPicPr>
+            <a:picLocks noChangeAspect="1"/>
+          </p:cNvPicPr>
+          <p:nvPr/>
+        </p:nvPicPr>
+        <p:blipFill>
+          <a:blip r:embed="rId3"/>
+          <a:stretch>
+            <a:fillRect/>
+          </a:stretch>
+        </p:blipFill>
+        <p:spPr>
+          <a:xfrm>
+            <a:off x="3879720" y="2673869"/>
+            <a:ext cx="3798917" cy="1960390"/>
           </a:xfrm>
           <a:prstGeom prst="rect">
             <a:avLst/>
@@ -20627,7 +20700,7 @@
           <p:cNvPr id="2" name="Title 1">
             <a:extLst>
               <a:ext uri="{FF2B5EF4-FFF2-40B4-BE49-F238E27FC236}">
-                <a16:creationId xmlns:a16="http://schemas.microsoft.com/office/drawing/2014/main" id="{EE8D9AE8-0E1B-2740-A95B-81DDAC2FCFA7}"/>
+                <a16:creationId xmlns:a16="http://schemas.microsoft.com/office/drawing/2014/main" id="{94FD4EFC-D48A-DA3F-61E2-FA850FA6542E}"/>
               </a:ext>
             </a:extLst>
           </p:cNvPr>
@@ -20645,15 +20718,114 @@
           <a:p>
             <a:r>
               <a:rPr lang="en-US" dirty="0"/>
-              <a:t>Demo</a:t>
+              <a:t>Comparing JSON files</a:t>
             </a:r>
           </a:p>
         </p:txBody>
       </p:sp>
+      <p:sp>
+        <p:nvSpPr>
+          <p:cNvPr id="4" name="Slide Number Placeholder 3">
+            <a:extLst>
+              <a:ext uri="{FF2B5EF4-FFF2-40B4-BE49-F238E27FC236}">
+                <a16:creationId xmlns:a16="http://schemas.microsoft.com/office/drawing/2014/main" id="{6041F5D2-0822-CEBB-241C-9E51B349A05C}"/>
+              </a:ext>
+            </a:extLst>
+          </p:cNvPr>
+          <p:cNvSpPr>
+            <a:spLocks noGrp="1"/>
+          </p:cNvSpPr>
+          <p:nvPr>
+            <p:ph type="sldNum" sz="quarter" idx="12"/>
+          </p:nvPr>
+        </p:nvSpPr>
+        <p:spPr/>
+        <p:txBody>
+          <a:bodyPr/>
+          <a:lstStyle/>
+          <a:p>
+            <a:fld id="{EB4FF9C4-EEBF-D24D-8A4E-C0B9CCE3F975}" type="slidenum">
+              <a:rPr lang="en-US" smtClean="0"/>
+              <a:t>35</a:t>
+            </a:fld>
+            <a:endParaRPr lang="en-US" dirty="0"/>
+          </a:p>
+        </p:txBody>
+      </p:sp>
+      <p:sp>
+        <p:nvSpPr>
+          <p:cNvPr id="6" name="Content Placeholder 5">
+            <a:extLst>
+              <a:ext uri="{FF2B5EF4-FFF2-40B4-BE49-F238E27FC236}">
+                <a16:creationId xmlns:a16="http://schemas.microsoft.com/office/drawing/2014/main" id="{E4C8D7BD-A798-BDB5-4EF1-6262A623F571}"/>
+              </a:ext>
+            </a:extLst>
+          </p:cNvPr>
+          <p:cNvSpPr>
+            <a:spLocks noGrp="1"/>
+          </p:cNvSpPr>
+          <p:nvPr>
+            <p:ph idx="1"/>
+          </p:nvPr>
+        </p:nvSpPr>
+        <p:spPr>
+          <a:xfrm>
+            <a:off x="800100" y="886807"/>
+            <a:ext cx="7886700" cy="3521473"/>
+          </a:xfrm>
+        </p:spPr>
+        <p:txBody>
+          <a:bodyPr/>
+          <a:lstStyle/>
+          <a:p>
+            <a:pPr marL="0" indent="0">
+              <a:buNone/>
+            </a:pPr>
+            <a:r>
+              <a:rPr lang="en-US" dirty="0" err="1"/>
+              <a:t>WinMerge</a:t>
+            </a:r>
+            <a:r>
+              <a:rPr lang="en-US" dirty="0"/>
+              <a:t> (https://winmerge.org/) can compare JSON files in 'pretty' mode</a:t>
+            </a:r>
+          </a:p>
+        </p:txBody>
+      </p:sp>
+      <p:pic>
+        <p:nvPicPr>
+          <p:cNvPr id="8" name="Picture 7">
+            <a:extLst>
+              <a:ext uri="{FF2B5EF4-FFF2-40B4-BE49-F238E27FC236}">
+                <a16:creationId xmlns:a16="http://schemas.microsoft.com/office/drawing/2014/main" id="{A1B53C0E-3CBC-8552-B863-00347C926855}"/>
+              </a:ext>
+            </a:extLst>
+          </p:cNvPr>
+          <p:cNvPicPr>
+            <a:picLocks noChangeAspect="1"/>
+          </p:cNvPicPr>
+          <p:nvPr/>
+        </p:nvPicPr>
+        <p:blipFill>
+          <a:blip r:embed="rId2"/>
+          <a:stretch>
+            <a:fillRect/>
+          </a:stretch>
+        </p:blipFill>
+        <p:spPr>
+          <a:xfrm>
+            <a:off x="2165466" y="1253744"/>
+            <a:ext cx="6639993" cy="3650441"/>
+          </a:xfrm>
+          <a:prstGeom prst="rect">
+            <a:avLst/>
+          </a:prstGeom>
+        </p:spPr>
+      </p:pic>
     </p:spTree>
     <p:extLst>
       <p:ext uri="{BB962C8B-B14F-4D97-AF65-F5344CB8AC3E}">
-        <p14:creationId xmlns:p14="http://schemas.microsoft.com/office/powerpoint/2010/main" val="190324516"/>
+        <p14:creationId xmlns:p14="http://schemas.microsoft.com/office/powerpoint/2010/main" val="1955289123"/>
       </p:ext>
     </p:extLst>
   </p:cSld>
@@ -20664,6 +20836,768 @@
 </file>
 
 <file path=ppt/slides/slide36.xml><?xml version="1.0" encoding="utf-8"?>
+<p:sld xmlns:a="http://schemas.openxmlformats.org/drawingml/2006/main" xmlns:r="http://schemas.openxmlformats.org/officeDocument/2006/relationships" xmlns:p="http://schemas.openxmlformats.org/presentationml/2006/main">
+  <p:cSld>
+    <p:spTree>
+      <p:nvGrpSpPr>
+        <p:cNvPr id="1" name=""/>
+        <p:cNvGrpSpPr/>
+        <p:nvPr/>
+      </p:nvGrpSpPr>
+      <p:grpSpPr>
+        <a:xfrm>
+          <a:off x="0" y="0"/>
+          <a:ext cx="0" cy="0"/>
+          <a:chOff x="0" y="0"/>
+          <a:chExt cx="0" cy="0"/>
+        </a:xfrm>
+      </p:grpSpPr>
+      <p:sp>
+        <p:nvSpPr>
+          <p:cNvPr id="2" name="Title 1">
+            <a:extLst>
+              <a:ext uri="{FF2B5EF4-FFF2-40B4-BE49-F238E27FC236}">
+                <a16:creationId xmlns:a16="http://schemas.microsoft.com/office/drawing/2014/main" id="{94FD4EFC-D48A-DA3F-61E2-FA850FA6542E}"/>
+              </a:ext>
+            </a:extLst>
+          </p:cNvPr>
+          <p:cNvSpPr>
+            <a:spLocks noGrp="1"/>
+          </p:cNvSpPr>
+          <p:nvPr>
+            <p:ph type="title"/>
+          </p:nvPr>
+        </p:nvSpPr>
+        <p:spPr/>
+        <p:txBody>
+          <a:bodyPr/>
+          <a:lstStyle/>
+          <a:p>
+            <a:r>
+              <a:rPr lang="en-US" dirty="0"/>
+              <a:t>Comparing SAS datasets</a:t>
+            </a:r>
+          </a:p>
+        </p:txBody>
+      </p:sp>
+      <p:sp>
+        <p:nvSpPr>
+          <p:cNvPr id="4" name="Slide Number Placeholder 3">
+            <a:extLst>
+              <a:ext uri="{FF2B5EF4-FFF2-40B4-BE49-F238E27FC236}">
+                <a16:creationId xmlns:a16="http://schemas.microsoft.com/office/drawing/2014/main" id="{6041F5D2-0822-CEBB-241C-9E51B349A05C}"/>
+              </a:ext>
+            </a:extLst>
+          </p:cNvPr>
+          <p:cNvSpPr>
+            <a:spLocks noGrp="1"/>
+          </p:cNvSpPr>
+          <p:nvPr>
+            <p:ph type="sldNum" sz="quarter" idx="12"/>
+          </p:nvPr>
+        </p:nvSpPr>
+        <p:spPr/>
+        <p:txBody>
+          <a:bodyPr/>
+          <a:lstStyle/>
+          <a:p>
+            <a:fld id="{EB4FF9C4-EEBF-D24D-8A4E-C0B9CCE3F975}" type="slidenum">
+              <a:rPr lang="en-US" smtClean="0"/>
+              <a:t>36</a:t>
+            </a:fld>
+            <a:endParaRPr lang="en-US" dirty="0"/>
+          </a:p>
+        </p:txBody>
+      </p:sp>
+      <p:sp>
+        <p:nvSpPr>
+          <p:cNvPr id="6" name="Content Placeholder 5">
+            <a:extLst>
+              <a:ext uri="{FF2B5EF4-FFF2-40B4-BE49-F238E27FC236}">
+                <a16:creationId xmlns:a16="http://schemas.microsoft.com/office/drawing/2014/main" id="{E4C8D7BD-A798-BDB5-4EF1-6262A623F571}"/>
+              </a:ext>
+            </a:extLst>
+          </p:cNvPr>
+          <p:cNvSpPr>
+            <a:spLocks noGrp="1"/>
+          </p:cNvSpPr>
+          <p:nvPr>
+            <p:ph idx="1"/>
+          </p:nvPr>
+        </p:nvSpPr>
+        <p:spPr>
+          <a:xfrm>
+            <a:off x="800100" y="886807"/>
+            <a:ext cx="7886700" cy="3521473"/>
+          </a:xfrm>
+        </p:spPr>
+        <p:txBody>
+          <a:bodyPr>
+            <a:normAutofit/>
+          </a:bodyPr>
+          <a:lstStyle/>
+          <a:p>
+            <a:pPr marL="0" indent="0">
+              <a:buNone/>
+            </a:pPr>
+            <a:r>
+              <a:rPr lang="en-US" dirty="0"/>
+              <a:t>PROC COMPARE</a:t>
+            </a:r>
+          </a:p>
+          <a:p>
+            <a:pPr marL="0" indent="0">
+              <a:buNone/>
+            </a:pPr>
+            <a:endParaRPr lang="en-US" dirty="0"/>
+          </a:p>
+          <a:p>
+            <a:pPr marL="0" indent="0">
+              <a:buNone/>
+            </a:pPr>
+            <a:r>
+              <a:rPr lang="en-US" sz="1400" b="1" dirty="0">
+                <a:solidFill>
+                  <a:srgbClr val="000080"/>
+                </a:solidFill>
+                <a:latin typeface="Consolas" panose="020B0609020204030204" pitchFamily="49" charset="0"/>
+              </a:rPr>
+              <a:t>%macro</a:t>
+            </a:r>
+            <a:r>
+              <a:rPr lang="en-US" sz="1400" b="0" dirty="0">
+                <a:solidFill>
+                  <a:srgbClr val="000000"/>
+                </a:solidFill>
+                <a:latin typeface="Consolas" panose="020B0609020204030204" pitchFamily="49" charset="0"/>
+              </a:rPr>
+              <a:t> </a:t>
+            </a:r>
+            <a:r>
+              <a:rPr lang="en-US" sz="1400" b="0" dirty="0" err="1">
+                <a:solidFill>
+                  <a:srgbClr val="000000"/>
+                </a:solidFill>
+                <a:latin typeface="Consolas" panose="020B0609020204030204" pitchFamily="49" charset="0"/>
+              </a:rPr>
+              <a:t>utl_comparedata</a:t>
+            </a:r>
+            <a:r>
+              <a:rPr lang="en-US" sz="1400" b="0" dirty="0">
+                <a:solidFill>
+                  <a:srgbClr val="000000"/>
+                </a:solidFill>
+                <a:latin typeface="Consolas" panose="020B0609020204030204" pitchFamily="49" charset="0"/>
+              </a:rPr>
+              <a:t>(</a:t>
+            </a:r>
+          </a:p>
+          <a:p>
+            <a:pPr marL="0" indent="0">
+              <a:buNone/>
+            </a:pPr>
+            <a:r>
+              <a:rPr lang="en-US" sz="1400" b="0" dirty="0">
+                <a:solidFill>
+                  <a:srgbClr val="000000"/>
+                </a:solidFill>
+                <a:latin typeface="Consolas" panose="020B0609020204030204" pitchFamily="49" charset="0"/>
+              </a:rPr>
+              <a:t>  </a:t>
+            </a:r>
+            <a:r>
+              <a:rPr lang="en-US" sz="1400" b="0" dirty="0" err="1">
+                <a:solidFill>
+                  <a:srgbClr val="000000"/>
+                </a:solidFill>
+                <a:latin typeface="Consolas" panose="020B0609020204030204" pitchFamily="49" charset="0"/>
+              </a:rPr>
+              <a:t>baselib</a:t>
+            </a:r>
+            <a:r>
+              <a:rPr lang="en-US" sz="1400" b="0" dirty="0">
+                <a:solidFill>
+                  <a:srgbClr val="000000"/>
+                </a:solidFill>
+                <a:latin typeface="Consolas" panose="020B0609020204030204" pitchFamily="49" charset="0"/>
+              </a:rPr>
+              <a:t>=, </a:t>
+            </a:r>
+          </a:p>
+          <a:p>
+            <a:pPr marL="0" indent="0">
+              <a:buNone/>
+            </a:pPr>
+            <a:r>
+              <a:rPr lang="en-US" sz="1400" b="0" dirty="0">
+                <a:solidFill>
+                  <a:srgbClr val="000000"/>
+                </a:solidFill>
+                <a:latin typeface="Consolas" panose="020B0609020204030204" pitchFamily="49" charset="0"/>
+              </a:rPr>
+              <a:t>  </a:t>
+            </a:r>
+            <a:r>
+              <a:rPr lang="en-US" sz="1400" b="0" dirty="0" err="1">
+                <a:solidFill>
+                  <a:srgbClr val="000000"/>
+                </a:solidFill>
+                <a:latin typeface="Consolas" panose="020B0609020204030204" pitchFamily="49" charset="0"/>
+              </a:rPr>
+              <a:t>complib</a:t>
+            </a:r>
+            <a:r>
+              <a:rPr lang="en-US" sz="1400" b="0" dirty="0">
+                <a:solidFill>
+                  <a:srgbClr val="000000"/>
+                </a:solidFill>
+                <a:latin typeface="Consolas" panose="020B0609020204030204" pitchFamily="49" charset="0"/>
+              </a:rPr>
+              <a:t>=, </a:t>
+            </a:r>
+          </a:p>
+          <a:p>
+            <a:pPr marL="0" indent="0">
+              <a:buNone/>
+            </a:pPr>
+            <a:r>
+              <a:rPr lang="en-US" sz="1400" b="0" dirty="0">
+                <a:solidFill>
+                  <a:srgbClr val="000000"/>
+                </a:solidFill>
+                <a:latin typeface="Consolas" panose="020B0609020204030204" pitchFamily="49" charset="0"/>
+              </a:rPr>
+              <a:t>  </a:t>
+            </a:r>
+            <a:r>
+              <a:rPr lang="en-US" sz="1400" b="0" dirty="0" err="1">
+                <a:solidFill>
+                  <a:srgbClr val="000000"/>
+                </a:solidFill>
+                <a:latin typeface="Consolas" panose="020B0609020204030204" pitchFamily="49" charset="0"/>
+              </a:rPr>
+              <a:t>dsname</a:t>
+            </a:r>
+            <a:r>
+              <a:rPr lang="en-US" sz="1400" b="0" dirty="0">
+                <a:solidFill>
+                  <a:srgbClr val="000000"/>
+                </a:solidFill>
+                <a:latin typeface="Consolas" panose="020B0609020204030204" pitchFamily="49" charset="0"/>
+              </a:rPr>
+              <a:t>=, </a:t>
+            </a:r>
+          </a:p>
+          <a:p>
+            <a:pPr marL="0" indent="0">
+              <a:buNone/>
+            </a:pPr>
+            <a:r>
+              <a:rPr lang="en-US" sz="1400" b="0" dirty="0">
+                <a:solidFill>
+                  <a:srgbClr val="000000"/>
+                </a:solidFill>
+                <a:latin typeface="Consolas" panose="020B0609020204030204" pitchFamily="49" charset="0"/>
+              </a:rPr>
+              <a:t>  </a:t>
+            </a:r>
+            <a:r>
+              <a:rPr lang="en-US" sz="1400" b="0" dirty="0" err="1">
+                <a:solidFill>
+                  <a:srgbClr val="000000"/>
+                </a:solidFill>
+                <a:latin typeface="Consolas" panose="020B0609020204030204" pitchFamily="49" charset="0"/>
+              </a:rPr>
+              <a:t>compareoptions</a:t>
+            </a:r>
+            <a:r>
+              <a:rPr lang="en-US" sz="1400" b="0" dirty="0">
+                <a:solidFill>
+                  <a:srgbClr val="000000"/>
+                </a:solidFill>
+                <a:latin typeface="Consolas" panose="020B0609020204030204" pitchFamily="49" charset="0"/>
+              </a:rPr>
+              <a:t>=</a:t>
+            </a:r>
+            <a:r>
+              <a:rPr lang="en-US" sz="1400" b="0" dirty="0">
+                <a:solidFill>
+                  <a:srgbClr val="0000FF"/>
+                </a:solidFill>
+                <a:latin typeface="Consolas" panose="020B0609020204030204" pitchFamily="49" charset="0"/>
+              </a:rPr>
+              <a:t>%str</a:t>
+            </a:r>
+            <a:r>
+              <a:rPr lang="en-US" sz="1400" b="0" dirty="0">
+                <a:solidFill>
+                  <a:srgbClr val="000000"/>
+                </a:solidFill>
+                <a:latin typeface="Consolas" panose="020B0609020204030204" pitchFamily="49" charset="0"/>
+              </a:rPr>
+              <a:t>(</a:t>
+            </a:r>
+            <a:r>
+              <a:rPr lang="en-US" sz="1400" b="0" dirty="0" err="1">
+                <a:solidFill>
+                  <a:srgbClr val="000000"/>
+                </a:solidFill>
+                <a:latin typeface="Consolas" panose="020B0609020204030204" pitchFamily="49" charset="0"/>
+              </a:rPr>
+              <a:t>listall</a:t>
+            </a:r>
+            <a:r>
+              <a:rPr lang="en-US" sz="1400" b="0" dirty="0">
+                <a:solidFill>
+                  <a:srgbClr val="000000"/>
+                </a:solidFill>
+                <a:latin typeface="Consolas" panose="020B0609020204030204" pitchFamily="49" charset="0"/>
+              </a:rPr>
+              <a:t> criterion=</a:t>
+            </a:r>
+            <a:r>
+              <a:rPr lang="en-US" sz="1400" b="1" dirty="0">
+                <a:solidFill>
+                  <a:srgbClr val="008080"/>
+                </a:solidFill>
+                <a:latin typeface="Consolas" panose="020B0609020204030204" pitchFamily="49" charset="0"/>
+              </a:rPr>
+              <a:t>0.00000001</a:t>
+            </a:r>
+            <a:r>
+              <a:rPr lang="en-US" sz="1400" b="0" dirty="0">
+                <a:solidFill>
+                  <a:srgbClr val="000000"/>
+                </a:solidFill>
+                <a:latin typeface="Consolas" panose="020B0609020204030204" pitchFamily="49" charset="0"/>
+              </a:rPr>
+              <a:t> method=absolute),</a:t>
+            </a:r>
+          </a:p>
+          <a:p>
+            <a:pPr marL="0" indent="0">
+              <a:buNone/>
+            </a:pPr>
+            <a:r>
+              <a:rPr lang="en-US" sz="1400" b="0" dirty="0">
+                <a:solidFill>
+                  <a:srgbClr val="000000"/>
+                </a:solidFill>
+                <a:latin typeface="Consolas" panose="020B0609020204030204" pitchFamily="49" charset="0"/>
+              </a:rPr>
+              <a:t>  </a:t>
+            </a:r>
+            <a:r>
+              <a:rPr lang="en-US" sz="1400" b="0" dirty="0" err="1">
+                <a:solidFill>
+                  <a:srgbClr val="000000"/>
+                </a:solidFill>
+                <a:latin typeface="Consolas" panose="020B0609020204030204" pitchFamily="49" charset="0"/>
+              </a:rPr>
+              <a:t>resultds</a:t>
+            </a:r>
+            <a:r>
+              <a:rPr lang="en-US" sz="1400" b="0" dirty="0">
+                <a:solidFill>
+                  <a:srgbClr val="000000"/>
+                </a:solidFill>
+                <a:latin typeface="Consolas" panose="020B0609020204030204" pitchFamily="49" charset="0"/>
+              </a:rPr>
+              <a:t>=,</a:t>
+            </a:r>
+          </a:p>
+          <a:p>
+            <a:pPr marL="0" indent="0">
+              <a:buNone/>
+            </a:pPr>
+            <a:r>
+              <a:rPr lang="en-US" sz="1400" b="0" dirty="0">
+                <a:solidFill>
+                  <a:srgbClr val="000000"/>
+                </a:solidFill>
+                <a:latin typeface="Consolas" panose="020B0609020204030204" pitchFamily="49" charset="0"/>
+              </a:rPr>
+              <a:t>  </a:t>
+            </a:r>
+            <a:r>
+              <a:rPr lang="en-US" sz="1400" b="0" dirty="0" err="1">
+                <a:solidFill>
+                  <a:srgbClr val="000000"/>
+                </a:solidFill>
+                <a:latin typeface="Consolas" panose="020B0609020204030204" pitchFamily="49" charset="0"/>
+              </a:rPr>
+              <a:t>detailall</a:t>
+            </a:r>
+            <a:r>
+              <a:rPr lang="en-US" sz="1400" b="0" dirty="0">
+                <a:solidFill>
+                  <a:srgbClr val="000000"/>
+                </a:solidFill>
+                <a:latin typeface="Consolas" panose="020B0609020204030204" pitchFamily="49" charset="0"/>
+              </a:rPr>
+              <a:t>=N</a:t>
+            </a:r>
+          </a:p>
+          <a:p>
+            <a:pPr marL="0" indent="0">
+              <a:buNone/>
+            </a:pPr>
+            <a:r>
+              <a:rPr lang="en-US" sz="1400" b="0" dirty="0">
+                <a:solidFill>
+                  <a:srgbClr val="000000"/>
+                </a:solidFill>
+                <a:latin typeface="Consolas" panose="020B0609020204030204" pitchFamily="49" charset="0"/>
+              </a:rPr>
+              <a:t>  );</a:t>
+            </a:r>
+            <a:endParaRPr lang="en-US" sz="1400" dirty="0">
+              <a:latin typeface="Consolas" panose="020B0609020204030204" pitchFamily="49" charset="0"/>
+            </a:endParaRPr>
+          </a:p>
+        </p:txBody>
+      </p:sp>
+    </p:spTree>
+    <p:extLst>
+      <p:ext uri="{BB962C8B-B14F-4D97-AF65-F5344CB8AC3E}">
+        <p14:creationId xmlns:p14="http://schemas.microsoft.com/office/powerpoint/2010/main" val="327093906"/>
+      </p:ext>
+    </p:extLst>
+  </p:cSld>
+  <p:clrMapOvr>
+    <a:masterClrMapping/>
+  </p:clrMapOvr>
+</p:sld>
+</file>
+
+<file path=ppt/slides/slide37.xml><?xml version="1.0" encoding="utf-8"?>
+<p:sld xmlns:a="http://schemas.openxmlformats.org/drawingml/2006/main" xmlns:r="http://schemas.openxmlformats.org/officeDocument/2006/relationships" xmlns:p="http://schemas.openxmlformats.org/presentationml/2006/main">
+  <p:cSld>
+    <p:spTree>
+      <p:nvGrpSpPr>
+        <p:cNvPr id="1" name=""/>
+        <p:cNvGrpSpPr/>
+        <p:nvPr/>
+      </p:nvGrpSpPr>
+      <p:grpSpPr>
+        <a:xfrm>
+          <a:off x="0" y="0"/>
+          <a:ext cx="0" cy="0"/>
+          <a:chOff x="0" y="0"/>
+          <a:chExt cx="0" cy="0"/>
+        </a:xfrm>
+      </p:grpSpPr>
+      <p:pic>
+        <p:nvPicPr>
+          <p:cNvPr id="15" name="Picture 14">
+            <a:extLst>
+              <a:ext uri="{FF2B5EF4-FFF2-40B4-BE49-F238E27FC236}">
+                <a16:creationId xmlns:a16="http://schemas.microsoft.com/office/drawing/2014/main" id="{9476738E-1DBD-D666-734B-AFF27CC72472}"/>
+              </a:ext>
+            </a:extLst>
+          </p:cNvPr>
+          <p:cNvPicPr>
+            <a:picLocks noChangeAspect="1"/>
+          </p:cNvPicPr>
+          <p:nvPr/>
+        </p:nvPicPr>
+        <p:blipFill>
+          <a:blip r:embed="rId2"/>
+          <a:stretch>
+            <a:fillRect/>
+          </a:stretch>
+        </p:blipFill>
+        <p:spPr>
+          <a:xfrm>
+            <a:off x="0" y="562308"/>
+            <a:ext cx="9144000" cy="4088221"/>
+          </a:xfrm>
+          <a:prstGeom prst="rect">
+            <a:avLst/>
+          </a:prstGeom>
+        </p:spPr>
+      </p:pic>
+      <p:sp>
+        <p:nvSpPr>
+          <p:cNvPr id="2" name="Title 1">
+            <a:extLst>
+              <a:ext uri="{FF2B5EF4-FFF2-40B4-BE49-F238E27FC236}">
+                <a16:creationId xmlns:a16="http://schemas.microsoft.com/office/drawing/2014/main" id="{94FD4EFC-D48A-DA3F-61E2-FA850FA6542E}"/>
+              </a:ext>
+            </a:extLst>
+          </p:cNvPr>
+          <p:cNvSpPr>
+            <a:spLocks noGrp="1"/>
+          </p:cNvSpPr>
+          <p:nvPr>
+            <p:ph type="title"/>
+          </p:nvPr>
+        </p:nvSpPr>
+        <p:spPr/>
+        <p:txBody>
+          <a:bodyPr/>
+          <a:lstStyle/>
+          <a:p>
+            <a:r>
+              <a:rPr lang="en-US" dirty="0"/>
+              <a:t>Comparing SAS datasets</a:t>
+            </a:r>
+          </a:p>
+        </p:txBody>
+      </p:sp>
+      <p:sp>
+        <p:nvSpPr>
+          <p:cNvPr id="4" name="Slide Number Placeholder 3">
+            <a:extLst>
+              <a:ext uri="{FF2B5EF4-FFF2-40B4-BE49-F238E27FC236}">
+                <a16:creationId xmlns:a16="http://schemas.microsoft.com/office/drawing/2014/main" id="{6041F5D2-0822-CEBB-241C-9E51B349A05C}"/>
+              </a:ext>
+            </a:extLst>
+          </p:cNvPr>
+          <p:cNvSpPr>
+            <a:spLocks noGrp="1"/>
+          </p:cNvSpPr>
+          <p:nvPr>
+            <p:ph type="sldNum" sz="quarter" idx="12"/>
+          </p:nvPr>
+        </p:nvSpPr>
+        <p:spPr/>
+        <p:txBody>
+          <a:bodyPr/>
+          <a:lstStyle/>
+          <a:p>
+            <a:fld id="{EB4FF9C4-EEBF-D24D-8A4E-C0B9CCE3F975}" type="slidenum">
+              <a:rPr lang="en-US" smtClean="0"/>
+              <a:t>37</a:t>
+            </a:fld>
+            <a:endParaRPr lang="en-US" dirty="0"/>
+          </a:p>
+        </p:txBody>
+      </p:sp>
+      <p:pic>
+        <p:nvPicPr>
+          <p:cNvPr id="12" name="Picture 11">
+            <a:extLst>
+              <a:ext uri="{FF2B5EF4-FFF2-40B4-BE49-F238E27FC236}">
+                <a16:creationId xmlns:a16="http://schemas.microsoft.com/office/drawing/2014/main" id="{04EA9BA7-E4D8-58F6-CD19-E18D6D08B5DC}"/>
+              </a:ext>
+            </a:extLst>
+          </p:cNvPr>
+          <p:cNvPicPr>
+            <a:picLocks noChangeAspect="1"/>
+          </p:cNvPicPr>
+          <p:nvPr/>
+        </p:nvPicPr>
+        <p:blipFill>
+          <a:blip r:embed="rId3"/>
+          <a:stretch>
+            <a:fillRect/>
+          </a:stretch>
+        </p:blipFill>
+        <p:spPr>
+          <a:xfrm>
+            <a:off x="56337" y="149453"/>
+            <a:ext cx="6798839" cy="4877625"/>
+          </a:xfrm>
+          <a:prstGeom prst="rect">
+            <a:avLst/>
+          </a:prstGeom>
+          <a:ln>
+            <a:solidFill>
+              <a:schemeClr val="accent1"/>
+            </a:solidFill>
+          </a:ln>
+        </p:spPr>
+      </p:pic>
+      <p:sp>
+        <p:nvSpPr>
+          <p:cNvPr id="16" name="Rectangle 15">
+            <a:extLst>
+              <a:ext uri="{FF2B5EF4-FFF2-40B4-BE49-F238E27FC236}">
+                <a16:creationId xmlns:a16="http://schemas.microsoft.com/office/drawing/2014/main" id="{9A94960B-0362-B2AA-C8C6-5A0D547FE7F3}"/>
+              </a:ext>
+            </a:extLst>
+          </p:cNvPr>
+          <p:cNvSpPr/>
+          <p:nvPr/>
+        </p:nvSpPr>
+        <p:spPr>
+          <a:xfrm>
+            <a:off x="6864500" y="994172"/>
+            <a:ext cx="2223163" cy="3699170"/>
+          </a:xfrm>
+          <a:prstGeom prst="rect">
+            <a:avLst/>
+          </a:prstGeom>
+          <a:noFill/>
+          <a:ln w="15875">
+            <a:solidFill>
+              <a:srgbClr val="FF0000"/>
+            </a:solidFill>
+          </a:ln>
+        </p:spPr>
+        <p:style>
+          <a:lnRef idx="2">
+            <a:schemeClr val="accent1">
+              <a:shade val="50000"/>
+            </a:schemeClr>
+          </a:lnRef>
+          <a:fillRef idx="1">
+            <a:schemeClr val="accent1"/>
+          </a:fillRef>
+          <a:effectRef idx="0">
+            <a:schemeClr val="accent1"/>
+          </a:effectRef>
+          <a:fontRef idx="minor">
+            <a:schemeClr val="lt1"/>
+          </a:fontRef>
+        </p:style>
+        <p:txBody>
+          <a:bodyPr rtlCol="0" anchor="ctr"/>
+          <a:lstStyle/>
+          <a:p>
+            <a:pPr algn="ctr"/>
+            <a:endParaRPr lang="en-US"/>
+          </a:p>
+        </p:txBody>
+      </p:sp>
+    </p:spTree>
+    <p:extLst>
+      <p:ext uri="{BB962C8B-B14F-4D97-AF65-F5344CB8AC3E}">
+        <p14:creationId xmlns:p14="http://schemas.microsoft.com/office/powerpoint/2010/main" val="3981516137"/>
+      </p:ext>
+    </p:extLst>
+  </p:cSld>
+  <p:clrMapOvr>
+    <a:masterClrMapping/>
+  </p:clrMapOvr>
+  <p:timing>
+    <p:tnLst>
+      <p:par>
+        <p:cTn id="1" dur="indefinite" restart="never" nodeType="tmRoot">
+          <p:childTnLst>
+            <p:seq concurrent="1" nextAc="seek">
+              <p:cTn id="2" dur="indefinite" nodeType="mainSeq">
+                <p:childTnLst>
+                  <p:par>
+                    <p:cTn id="3" fill="hold">
+                      <p:stCondLst>
+                        <p:cond delay="indefinite"/>
+                      </p:stCondLst>
+                      <p:childTnLst>
+                        <p:par>
+                          <p:cTn id="4" fill="hold">
+                            <p:stCondLst>
+                              <p:cond delay="0"/>
+                            </p:stCondLst>
+                            <p:childTnLst>
+                              <p:par>
+                                <p:cTn id="5" presetID="1" presetClass="entr" presetSubtype="0" fill="hold" grpId="0" nodeType="clickEffect">
+                                  <p:stCondLst>
+                                    <p:cond delay="0"/>
+                                  </p:stCondLst>
+                                  <p:childTnLst>
+                                    <p:set>
+                                      <p:cBhvr>
+                                        <p:cTn id="6" dur="1" fill="hold">
+                                          <p:stCondLst>
+                                            <p:cond delay="0"/>
+                                          </p:stCondLst>
+                                        </p:cTn>
+                                        <p:tgtEl>
+                                          <p:spTgt spid="16"/>
+                                        </p:tgtEl>
+                                        <p:attrNameLst>
+                                          <p:attrName>style.visibility</p:attrName>
+                                        </p:attrNameLst>
+                                      </p:cBhvr>
+                                      <p:to>
+                                        <p:strVal val="visible"/>
+                                      </p:to>
+                                    </p:set>
+                                  </p:childTnLst>
+                                </p:cTn>
+                              </p:par>
+                            </p:childTnLst>
+                          </p:cTn>
+                        </p:par>
+                      </p:childTnLst>
+                    </p:cTn>
+                  </p:par>
+                  <p:par>
+                    <p:cTn id="7" fill="hold">
+                      <p:stCondLst>
+                        <p:cond delay="indefinite"/>
+                      </p:stCondLst>
+                      <p:childTnLst>
+                        <p:par>
+                          <p:cTn id="8" fill="hold">
+                            <p:stCondLst>
+                              <p:cond delay="0"/>
+                            </p:stCondLst>
+                            <p:childTnLst>
+                              <p:par>
+                                <p:cTn id="9" presetID="1" presetClass="entr" presetSubtype="0" fill="hold" nodeType="clickEffect">
+                                  <p:stCondLst>
+                                    <p:cond delay="0"/>
+                                  </p:stCondLst>
+                                  <p:childTnLst>
+                                    <p:set>
+                                      <p:cBhvr>
+                                        <p:cTn id="10" dur="1" fill="hold">
+                                          <p:stCondLst>
+                                            <p:cond delay="0"/>
+                                          </p:stCondLst>
+                                        </p:cTn>
+                                        <p:tgtEl>
+                                          <p:spTgt spid="12"/>
+                                        </p:tgtEl>
+                                        <p:attrNameLst>
+                                          <p:attrName>style.visibility</p:attrName>
+                                        </p:attrNameLst>
+                                      </p:cBhvr>
+                                      <p:to>
+                                        <p:strVal val="visible"/>
+                                      </p:to>
+                                    </p:set>
+                                  </p:childTnLst>
+                                </p:cTn>
+                              </p:par>
+                            </p:childTnLst>
+                          </p:cTn>
+                        </p:par>
+                      </p:childTnLst>
+                    </p:cTn>
+                  </p:par>
+                </p:childTnLst>
+              </p:cTn>
+              <p:prevCondLst>
+                <p:cond evt="onPrev" delay="0">
+                  <p:tgtEl>
+                    <p:sldTgt/>
+                  </p:tgtEl>
+                </p:cond>
+              </p:prevCondLst>
+              <p:nextCondLst>
+                <p:cond evt="onNext" delay="0">
+                  <p:tgtEl>
+                    <p:sldTgt/>
+                  </p:tgtEl>
+                </p:cond>
+              </p:nextCondLst>
+            </p:seq>
+          </p:childTnLst>
+        </p:cTn>
+      </p:par>
+    </p:tnLst>
+    <p:bldLst>
+      <p:bldP spid="16" grpId="0" animBg="1"/>
+    </p:bldLst>
+  </p:timing>
+</p:sld>
+</file>
+
+<file path=ppt/slides/slide38.xml><?xml version="1.0" encoding="utf-8"?>
 <p:sld xmlns:a="http://schemas.openxmlformats.org/drawingml/2006/main" xmlns:r="http://schemas.openxmlformats.org/officeDocument/2006/relationships" xmlns:p="http://schemas.openxmlformats.org/presentationml/2006/main">
   <p:cSld>
     <p:spTree>
@@ -20703,6 +21637,64 @@
           <a:p>
             <a:r>
               <a:rPr lang="en-US" dirty="0"/>
+              <a:t>Demo</a:t>
+            </a:r>
+          </a:p>
+        </p:txBody>
+      </p:sp>
+    </p:spTree>
+    <p:extLst>
+      <p:ext uri="{BB962C8B-B14F-4D97-AF65-F5344CB8AC3E}">
+        <p14:creationId xmlns:p14="http://schemas.microsoft.com/office/powerpoint/2010/main" val="190324516"/>
+      </p:ext>
+    </p:extLst>
+  </p:cSld>
+  <p:clrMapOvr>
+    <a:masterClrMapping/>
+  </p:clrMapOvr>
+</p:sld>
+</file>
+
+<file path=ppt/slides/slide39.xml><?xml version="1.0" encoding="utf-8"?>
+<p:sld xmlns:a="http://schemas.openxmlformats.org/drawingml/2006/main" xmlns:r="http://schemas.openxmlformats.org/officeDocument/2006/relationships" xmlns:p="http://schemas.openxmlformats.org/presentationml/2006/main">
+  <p:cSld>
+    <p:spTree>
+      <p:nvGrpSpPr>
+        <p:cNvPr id="1" name=""/>
+        <p:cNvGrpSpPr/>
+        <p:nvPr/>
+      </p:nvGrpSpPr>
+      <p:grpSpPr>
+        <a:xfrm>
+          <a:off x="0" y="0"/>
+          <a:ext cx="0" cy="0"/>
+          <a:chOff x="0" y="0"/>
+          <a:chExt cx="0" cy="0"/>
+        </a:xfrm>
+      </p:grpSpPr>
+      <p:sp>
+        <p:nvSpPr>
+          <p:cNvPr id="2" name="Title 1">
+            <a:extLst>
+              <a:ext uri="{FF2B5EF4-FFF2-40B4-BE49-F238E27FC236}">
+                <a16:creationId xmlns:a16="http://schemas.microsoft.com/office/drawing/2014/main" id="{EE8D9AE8-0E1B-2740-A95B-81DDAC2FCFA7}"/>
+              </a:ext>
+            </a:extLst>
+          </p:cNvPr>
+          <p:cNvSpPr>
+            <a:spLocks noGrp="1"/>
+          </p:cNvSpPr>
+          <p:nvPr>
+            <p:ph type="title"/>
+          </p:nvPr>
+        </p:nvSpPr>
+        <p:spPr/>
+        <p:txBody>
+          <a:bodyPr/>
+          <a:lstStyle/>
+          <a:p>
+            <a:r>
+              <a:rPr lang="en-US" dirty="0"/>
               <a:t>Conclusion</a:t>
             </a:r>
           </a:p>
@@ -20721,7 +21713,90 @@
 </p:sld>
 </file>
 
-<file path=ppt/slides/slide37.xml><?xml version="1.0" encoding="utf-8"?>
+<file path=ppt/slides/slide4.xml><?xml version="1.0" encoding="utf-8"?>
+<p:sld xmlns:a="http://schemas.openxmlformats.org/drawingml/2006/main" xmlns:r="http://schemas.openxmlformats.org/officeDocument/2006/relationships" xmlns:p="http://schemas.openxmlformats.org/presentationml/2006/main">
+  <p:cSld>
+    <p:spTree>
+      <p:nvGrpSpPr>
+        <p:cNvPr id="1" name=""/>
+        <p:cNvGrpSpPr/>
+        <p:nvPr/>
+      </p:nvGrpSpPr>
+      <p:grpSpPr>
+        <a:xfrm>
+          <a:off x="0" y="0"/>
+          <a:ext cx="0" cy="0"/>
+          <a:chOff x="0" y="0"/>
+          <a:chExt cx="0" cy="0"/>
+        </a:xfrm>
+      </p:grpSpPr>
+      <p:sp>
+        <p:nvSpPr>
+          <p:cNvPr id="2" name="Title 1">
+            <a:extLst>
+              <a:ext uri="{FF2B5EF4-FFF2-40B4-BE49-F238E27FC236}">
+                <a16:creationId xmlns:a16="http://schemas.microsoft.com/office/drawing/2014/main" id="{EE8D9AE8-0E1B-2740-A95B-81DDAC2FCFA7}"/>
+              </a:ext>
+            </a:extLst>
+          </p:cNvPr>
+          <p:cNvSpPr>
+            <a:spLocks noGrp="1"/>
+          </p:cNvSpPr>
+          <p:nvPr>
+            <p:ph type="title"/>
+          </p:nvPr>
+        </p:nvSpPr>
+        <p:spPr/>
+        <p:txBody>
+          <a:bodyPr/>
+          <a:lstStyle/>
+          <a:p>
+            <a:r>
+              <a:rPr lang="en-US" dirty="0"/>
+              <a:t>Dataset-JSON Document Structure</a:t>
+            </a:r>
+          </a:p>
+        </p:txBody>
+      </p:sp>
+      <p:sp>
+        <p:nvSpPr>
+          <p:cNvPr id="3" name="Content Placeholder 2">
+            <a:extLst>
+              <a:ext uri="{FF2B5EF4-FFF2-40B4-BE49-F238E27FC236}">
+                <a16:creationId xmlns:a16="http://schemas.microsoft.com/office/drawing/2014/main" id="{8A19AC96-36D4-5E48-A3EC-AAD817F3E04E}"/>
+              </a:ext>
+            </a:extLst>
+          </p:cNvPr>
+          <p:cNvSpPr>
+            <a:spLocks noGrp="1"/>
+          </p:cNvSpPr>
+          <p:nvPr>
+            <p:ph idx="1"/>
+          </p:nvPr>
+        </p:nvSpPr>
+        <p:spPr/>
+        <p:txBody>
+          <a:bodyPr/>
+          <a:lstStyle/>
+          <a:p>
+            <a:endParaRPr lang="en-US" dirty="0"/>
+          </a:p>
+        </p:txBody>
+      </p:sp>
+    </p:spTree>
+    <p:extLst>
+      <p:ext uri="{BB962C8B-B14F-4D97-AF65-F5344CB8AC3E}">
+        <p14:creationId xmlns:p14="http://schemas.microsoft.com/office/powerpoint/2010/main" val="2495482614"/>
+      </p:ext>
+    </p:extLst>
+  </p:cSld>
+  <p:clrMapOvr>
+    <a:masterClrMapping/>
+  </p:clrMapOvr>
+</p:sld>
+</file>
+
+<file path=ppt/slides/slide40.xml><?xml version="1.0" encoding="utf-8"?>
 <p:sld xmlns:a="http://schemas.openxmlformats.org/drawingml/2006/main" xmlns:r="http://schemas.openxmlformats.org/officeDocument/2006/relationships" xmlns:p="http://schemas.openxmlformats.org/presentationml/2006/main">
   <p:cSld>
     <p:spTree>
@@ -20797,7 +21872,7 @@
             <a:fld id="{EB4FF9C4-EEBF-D24D-8A4E-C0B9CCE3F975}" type="slidenum">
               <a:rPr lang="en-US" smtClean="0"/>
               <a:pPr/>
-              <a:t>37</a:t>
+              <a:t>40</a:t>
             </a:fld>
             <a:endParaRPr lang="en-US" dirty="0"/>
           </a:p>
@@ -20911,7 +21986,7 @@
 </p:sld>
 </file>
 
-<file path=ppt/slides/slide38.xml><?xml version="1.0" encoding="utf-8"?>
+<file path=ppt/slides/slide41.xml><?xml version="1.0" encoding="utf-8"?>
 <p:sld xmlns:a="http://schemas.openxmlformats.org/drawingml/2006/main" xmlns:r="http://schemas.openxmlformats.org/officeDocument/2006/relationships" xmlns:p="http://schemas.openxmlformats.org/presentationml/2006/main">
   <p:cSld>
     <p:spTree>
@@ -21122,89 +22197,6 @@
     <p:extLst>
       <p:ext uri="{BB962C8B-B14F-4D97-AF65-F5344CB8AC3E}">
         <p14:creationId xmlns:p14="http://schemas.microsoft.com/office/powerpoint/2010/main" val="83496409"/>
-      </p:ext>
-    </p:extLst>
-  </p:cSld>
-  <p:clrMapOvr>
-    <a:masterClrMapping/>
-  </p:clrMapOvr>
-</p:sld>
-</file>
-
-<file path=ppt/slides/slide4.xml><?xml version="1.0" encoding="utf-8"?>
-<p:sld xmlns:a="http://schemas.openxmlformats.org/drawingml/2006/main" xmlns:r="http://schemas.openxmlformats.org/officeDocument/2006/relationships" xmlns:p="http://schemas.openxmlformats.org/presentationml/2006/main">
-  <p:cSld>
-    <p:spTree>
-      <p:nvGrpSpPr>
-        <p:cNvPr id="1" name=""/>
-        <p:cNvGrpSpPr/>
-        <p:nvPr/>
-      </p:nvGrpSpPr>
-      <p:grpSpPr>
-        <a:xfrm>
-          <a:off x="0" y="0"/>
-          <a:ext cx="0" cy="0"/>
-          <a:chOff x="0" y="0"/>
-          <a:chExt cx="0" cy="0"/>
-        </a:xfrm>
-      </p:grpSpPr>
-      <p:sp>
-        <p:nvSpPr>
-          <p:cNvPr id="2" name="Title 1">
-            <a:extLst>
-              <a:ext uri="{FF2B5EF4-FFF2-40B4-BE49-F238E27FC236}">
-                <a16:creationId xmlns:a16="http://schemas.microsoft.com/office/drawing/2014/main" id="{EE8D9AE8-0E1B-2740-A95B-81DDAC2FCFA7}"/>
-              </a:ext>
-            </a:extLst>
-          </p:cNvPr>
-          <p:cNvSpPr>
-            <a:spLocks noGrp="1"/>
-          </p:cNvSpPr>
-          <p:nvPr>
-            <p:ph type="title"/>
-          </p:nvPr>
-        </p:nvSpPr>
-        <p:spPr/>
-        <p:txBody>
-          <a:bodyPr/>
-          <a:lstStyle/>
-          <a:p>
-            <a:r>
-              <a:rPr lang="en-US" dirty="0"/>
-              <a:t>Dataset-JSON Document Structure</a:t>
-            </a:r>
-          </a:p>
-        </p:txBody>
-      </p:sp>
-      <p:sp>
-        <p:nvSpPr>
-          <p:cNvPr id="3" name="Content Placeholder 2">
-            <a:extLst>
-              <a:ext uri="{FF2B5EF4-FFF2-40B4-BE49-F238E27FC236}">
-                <a16:creationId xmlns:a16="http://schemas.microsoft.com/office/drawing/2014/main" id="{8A19AC96-36D4-5E48-A3EC-AAD817F3E04E}"/>
-              </a:ext>
-            </a:extLst>
-          </p:cNvPr>
-          <p:cNvSpPr>
-            <a:spLocks noGrp="1"/>
-          </p:cNvSpPr>
-          <p:nvPr>
-            <p:ph idx="1"/>
-          </p:nvPr>
-        </p:nvSpPr>
-        <p:spPr/>
-        <p:txBody>
-          <a:bodyPr/>
-          <a:lstStyle/>
-          <a:p>
-            <a:endParaRPr lang="en-US" dirty="0"/>
-          </a:p>
-        </p:txBody>
-      </p:sp>
-    </p:spTree>
-    <p:extLst>
-      <p:ext uri="{BB962C8B-B14F-4D97-AF65-F5344CB8AC3E}">
-        <p14:creationId xmlns:p14="http://schemas.microsoft.com/office/powerpoint/2010/main" val="2495482614"/>
       </p:ext>
     </p:extLst>
   </p:cSld>

</xml_diff>